<commit_message>
Update presentation (add transitions)
</commit_message>
<xml_diff>
--- a/Documentation-presentation/Presentation - ScaleFocus.pptx
+++ b/Documentation-presentation/Presentation - ScaleFocus.pptx
@@ -108,6 +108,11 @@
       </a:defRPr>
     </a:lvl9pPr>
   </p:defaultTextStyle>
+  <p:extLst>
+    <p:ext uri="{EFAFB233-063F-42B5-8137-9DF3F51BA10A}">
+      <p15:sldGuideLst xmlns:p15="http://schemas.microsoft.com/office/powerpoint/2012/main"/>
+    </p:ext>
+  </p:extLst>
 </p:presentation>
 </file>
 
@@ -6379,6 +6384,18 @@
   <p:clrMapOvr>
     <a:masterClrMapping/>
   </p:clrMapOvr>
+  <mc:AlternateContent xmlns:mc="http://schemas.openxmlformats.org/markup-compatibility/2006">
+    <mc:Choice xmlns:p14="http://schemas.microsoft.com/office/powerpoint/2010/main" Requires="p14">
+      <p:transition spd="slow" p14:dur="3400">
+        <p14:reveal/>
+      </p:transition>
+    </mc:Choice>
+    <mc:Fallback>
+      <p:transition spd="slow">
+        <p:fade/>
+      </p:transition>
+    </mc:Fallback>
+  </mc:AlternateContent>
   <p:timing>
     <p:tnLst>
       <p:par>
@@ -6488,6 +6505,9 @@
   <p:clrMapOvr>
     <a:masterClrMapping/>
   </p:clrMapOvr>
+  <p:transition spd="slow">
+    <p:push dir="u"/>
+  </p:transition>
   <p:timing>
     <p:tnLst>
       <p:par>
@@ -6609,6 +6629,9 @@
   <p:clrMapOvr>
     <a:masterClrMapping/>
   </p:clrMapOvr>
+  <p:transition spd="slow">
+    <p:push dir="u"/>
+  </p:transition>
   <p:timing>
     <p:tnLst>
       <p:par>
@@ -6881,6 +6904,9 @@
   <p:clrMapOvr>
     <a:masterClrMapping/>
   </p:clrMapOvr>
+  <p:transition spd="slow">
+    <p:push dir="u"/>
+  </p:transition>
   <p:timing>
     <p:tnLst>
       <p:par>
@@ -6976,6 +7002,9 @@
   <p:clrMapOvr>
     <a:masterClrMapping/>
   </p:clrMapOvr>
+  <p:transition spd="slow">
+    <p:push dir="u"/>
+  </p:transition>
   <p:timing>
     <p:tnLst>
       <p:par>

</xml_diff>

<commit_message>
Final changes on presentation and documentation
</commit_message>
<xml_diff>
--- a/Documentation-presentation/Presentation - ScaleFocus.pptx
+++ b/Documentation-presentation/Presentation - ScaleFocus.pptx
@@ -6384,13 +6384,13 @@
   <p:clrMapOvr>
     <a:masterClrMapping/>
   </p:clrMapOvr>
-  <mc:AlternateContent xmlns:mc="http://schemas.openxmlformats.org/markup-compatibility/2006">
-    <mc:Choice xmlns:p14="http://schemas.microsoft.com/office/powerpoint/2010/main" Requires="p14">
+  <mc:AlternateContent xmlns:mc="http://schemas.openxmlformats.org/markup-compatibility/2006" xmlns:p14="http://schemas.microsoft.com/office/powerpoint/2010/main">
+    <mc:Choice Requires="p14">
       <p:transition spd="slow" p14:dur="3400">
         <p14:reveal/>
       </p:transition>
     </mc:Choice>
-    <mc:Fallback>
+    <mc:Fallback xmlns="">
       <p:transition spd="slow">
         <p:fade/>
       </p:transition>
@@ -6589,25 +6589,18 @@
           <a:p>
             <a:r>
               <a:rPr lang="en-US" sz="2000" dirty="0" smtClean="0"/>
-              <a:t>Creating SQL database</a:t>
-            </a:r>
-          </a:p>
-          <a:p>
+              <a:t>Coding </a:t>
+            </a:r>
+            <a:endParaRPr lang="en-US" sz="2000" dirty="0" smtClean="0"/>
+          </a:p>
+          <a:p>
+            <a:r>
+              <a:rPr lang="en-US" sz="2000" smtClean="0"/>
+              <a:t>Writing </a:t>
+            </a:r>
             <a:r>
               <a:rPr lang="en-US" sz="2000" dirty="0" smtClean="0"/>
-              <a:t>Coding </a:t>
-            </a:r>
-          </a:p>
-          <a:p>
-            <a:r>
-              <a:rPr lang="en-US" sz="2000" dirty="0" smtClean="0"/>
-              <a:t>Connecting the app with the SQL database</a:t>
-            </a:r>
-          </a:p>
-          <a:p>
-            <a:r>
-              <a:rPr lang="en-US" sz="2000" dirty="0" smtClean="0"/>
-              <a:t>Writing a documentation</a:t>
+              <a:t>a documentation</a:t>
             </a:r>
           </a:p>
           <a:p>

</xml_diff>